<commit_message>
Update Version of Presentation
</commit_message>
<xml_diff>
--- a/CSCI4836-HW04-Presentation.pptx
+++ b/CSCI4836-HW04-Presentation.pptx
@@ -5,7 +5,7 @@
     <p:sldMasterId id="2147483648" r:id="rId1"/>
   </p:sldMasterIdLst>
   <p:notesMasterIdLst>
-    <p:notesMasterId r:id="rId23"/>
+    <p:notesMasterId r:id="rId19"/>
   </p:notesMasterIdLst>
   <p:sldIdLst>
     <p:sldId id="260" r:id="rId2"/>
@@ -25,10 +25,6 @@
     <p:sldId id="281" r:id="rId16"/>
     <p:sldId id="302" r:id="rId17"/>
     <p:sldId id="266" r:id="rId18"/>
-    <p:sldId id="274" r:id="rId19"/>
-    <p:sldId id="297" r:id="rId20"/>
-    <p:sldId id="317" r:id="rId21"/>
-    <p:sldId id="289" r:id="rId22"/>
   </p:sldIdLst>
   <p:sldSz cx="12192000" cy="6858000"/>
   <p:notesSz cx="6858000" cy="9144000"/>
@@ -129,14 +125,14 @@
   </p:defaultTextStyle>
   <p:extLst>
     <p:ext uri="{EFAFB233-063F-42B5-8137-9DF3F51BA10A}">
-      <p15:sldGuideLst xmlns:p15="http://schemas.microsoft.com/office/powerpoint/2012/main"/>
+      <p15:sldGuideLst xmlns:p15="http://schemas.microsoft.com/office/powerpoint/2012/main" xmlns=""/>
     </p:ext>
   </p:extLst>
 </p:presentation>
 </file>
 
 <file path=ppt/charts/chart1.xml><?xml version="1.0" encoding="utf-8"?>
-<c:chartSpace xmlns:c="http://schemas.openxmlformats.org/drawingml/2006/chart" xmlns:a="http://schemas.openxmlformats.org/drawingml/2006/main" xmlns:r="http://schemas.openxmlformats.org/officeDocument/2006/relationships" xmlns:c16r2="http://schemas.microsoft.com/office/drawing/2015/06/chart">
+<c:chartSpace xmlns:c="http://schemas.openxmlformats.org/drawingml/2006/chart" xmlns:a="http://schemas.openxmlformats.org/drawingml/2006/main" xmlns:r="http://schemas.openxmlformats.org/officeDocument/2006/relationships">
   <c:date1904 val="0"/>
   <c:lang val="en-US"/>
   <c:roundedCorners val="0"/>
@@ -184,26 +180,6 @@
         </a:ln>
         <a:effectLst/>
       </c:spPr>
-      <c:txPr>
-        <a:bodyPr rot="0" spcFirstLastPara="1" vertOverflow="ellipsis" vert="horz" wrap="square" anchor="ctr" anchorCtr="1"/>
-        <a:lstStyle/>
-        <a:p>
-          <a:pPr>
-            <a:defRPr sz="1862" b="0" i="0" u="none" strike="noStrike" kern="1200" cap="none" spc="20" baseline="0">
-              <a:solidFill>
-                <a:schemeClr val="tx1">
-                  <a:lumMod val="50000"/>
-                  <a:lumOff val="50000"/>
-                </a:schemeClr>
-              </a:solidFill>
-              <a:latin typeface="+mn-lt"/>
-              <a:ea typeface="+mn-ea"/>
-              <a:cs typeface="+mn-cs"/>
-            </a:defRPr>
-          </a:pPr>
-          <a:endParaRPr lang="ru-RU"/>
-        </a:p>
-      </c:txPr>
     </c:title>
     <c:autoTitleDeleted val="0"/>
     <c:plotArea>
@@ -291,7 +267,7 @@
                     <a:cs typeface="+mn-cs"/>
                   </a:defRPr>
                 </a:pPr>
-                <a:endParaRPr lang="ru-RU"/>
+                <a:endParaRPr lang="en-US"/>
               </a:p>
             </c:txPr>
             <c:dLblPos val="outEnd"/>
@@ -302,7 +278,7 @@
             <c:showPercent val="0"/>
             <c:showBubbleSize val="0"/>
             <c:showLeaderLines val="0"/>
-            <c:extLst>
+            <c:extLst xmlns:c16r2="http://schemas.microsoft.com/office/drawing/2015/06/chart">
               <c:ext xmlns:c15="http://schemas.microsoft.com/office/drawing/2012/chart" uri="{CE6537A1-D6FC-4f65-9D91-7224C49458BB}">
                 <c15:layout/>
                 <c15:showLeaderLines val="1"/>
@@ -363,7 +339,7 @@
               </c:numCache>
             </c:numRef>
           </c:val>
-          <c:extLst>
+          <c:extLst xmlns:c16r2="http://schemas.microsoft.com/office/drawing/2015/06/chart">
             <c:ext xmlns:c16="http://schemas.microsoft.com/office/drawing/2014/chart" uri="{C3380CC4-5D6E-409C-BE32-E72D297353CC}">
               <c16:uniqueId val="{00000000-0E84-4095-B2D7-27EA74712924}"/>
             </c:ext>
@@ -448,7 +424,7 @@
                     <a:cs typeface="+mn-cs"/>
                   </a:defRPr>
                 </a:pPr>
-                <a:endParaRPr lang="ru-RU"/>
+                <a:endParaRPr lang="en-US"/>
               </a:p>
             </c:txPr>
             <c:dLblPos val="outEnd"/>
@@ -459,7 +435,7 @@
             <c:showPercent val="0"/>
             <c:showBubbleSize val="0"/>
             <c:showLeaderLines val="0"/>
-            <c:extLst>
+            <c:extLst xmlns:c16r2="http://schemas.microsoft.com/office/drawing/2015/06/chart">
               <c:ext xmlns:c15="http://schemas.microsoft.com/office/drawing/2012/chart" uri="{CE6537A1-D6FC-4f65-9D91-7224C49458BB}">
                 <c15:layout/>
                 <c15:showLeaderLines val="1"/>
@@ -509,7 +485,7 @@
                   <c:v>2.4</c:v>
                 </c:pt>
                 <c:pt idx="1">
-                  <c:v>4.4000000000000004</c:v>
+                  <c:v>4.4</c:v>
                 </c:pt>
                 <c:pt idx="2">
                   <c:v>1.8</c:v>
@@ -520,7 +496,7 @@
               </c:numCache>
             </c:numRef>
           </c:val>
-          <c:extLst>
+          <c:extLst xmlns:c16r2="http://schemas.microsoft.com/office/drawing/2015/06/chart">
             <c:ext xmlns:c16="http://schemas.microsoft.com/office/drawing/2014/chart" uri="{C3380CC4-5D6E-409C-BE32-E72D297353CC}">
               <c16:uniqueId val="{00000001-0E84-4095-B2D7-27EA74712924}"/>
             </c:ext>
@@ -605,7 +581,7 @@
                     <a:cs typeface="+mn-cs"/>
                   </a:defRPr>
                 </a:pPr>
-                <a:endParaRPr lang="ru-RU"/>
+                <a:endParaRPr lang="en-US"/>
               </a:p>
             </c:txPr>
             <c:dLblPos val="outEnd"/>
@@ -616,7 +592,7 @@
             <c:showPercent val="0"/>
             <c:showBubbleSize val="0"/>
             <c:showLeaderLines val="0"/>
-            <c:extLst>
+            <c:extLst xmlns:c16r2="http://schemas.microsoft.com/office/drawing/2015/06/chart">
               <c:ext xmlns:c15="http://schemas.microsoft.com/office/drawing/2012/chart" uri="{CE6537A1-D6FC-4f65-9D91-7224C49458BB}">
                 <c15:layout/>
                 <c15:showLeaderLines val="1"/>
@@ -663,21 +639,21 @@
                 <c:formatCode>General</c:formatCode>
                 <c:ptCount val="4"/>
                 <c:pt idx="0">
-                  <c:v>2</c:v>
+                  <c:v>2.0</c:v>
                 </c:pt>
                 <c:pt idx="1">
-                  <c:v>2</c:v>
+                  <c:v>2.0</c:v>
                 </c:pt>
                 <c:pt idx="2">
-                  <c:v>3</c:v>
+                  <c:v>3.0</c:v>
                 </c:pt>
                 <c:pt idx="3">
-                  <c:v>5</c:v>
+                  <c:v>5.0</c:v>
                 </c:pt>
               </c:numCache>
             </c:numRef>
           </c:val>
-          <c:extLst>
+          <c:extLst xmlns:c16r2="http://schemas.microsoft.com/office/drawing/2015/06/chart">
             <c:ext xmlns:c16="http://schemas.microsoft.com/office/drawing/2014/chart" uri="{C3380CC4-5D6E-409C-BE32-E72D297353CC}">
               <c16:uniqueId val="{00000002-0E84-4095-B2D7-27EA74712924}"/>
             </c:ext>
@@ -694,11 +670,11 @@
         </c:dLbls>
         <c:gapWidth val="100"/>
         <c:overlap val="-24"/>
-        <c:axId val="320431704"/>
-        <c:axId val="320432488"/>
+        <c:axId val="-2138555416"/>
+        <c:axId val="-2138551768"/>
       </c:barChart>
       <c:catAx>
-        <c:axId val="320431704"/>
+        <c:axId val="-2138555416"/>
         <c:scaling>
           <c:orientation val="minMax"/>
         </c:scaling>
@@ -738,10 +714,10 @@
                 <a:cs typeface="+mn-cs"/>
               </a:defRPr>
             </a:pPr>
-            <a:endParaRPr lang="ru-RU"/>
+            <a:endParaRPr lang="en-US"/>
           </a:p>
         </c:txPr>
-        <c:crossAx val="320432488"/>
+        <c:crossAx val="-2138551768"/>
         <c:crosses val="autoZero"/>
         <c:auto val="1"/>
         <c:lblAlgn val="ctr"/>
@@ -749,7 +725,7 @@
         <c:noMultiLvlLbl val="0"/>
       </c:catAx>
       <c:valAx>
-        <c:axId val="320432488"/>
+        <c:axId val="-2138551768"/>
         <c:scaling>
           <c:orientation val="minMax"/>
         </c:scaling>
@@ -797,10 +773,10 @@
                 <a:cs typeface="+mn-cs"/>
               </a:defRPr>
             </a:pPr>
-            <a:endParaRPr lang="ru-RU"/>
+            <a:endParaRPr lang="en-US"/>
           </a:p>
         </c:txPr>
-        <c:crossAx val="320431704"/>
+        <c:crossAx val="-2138555416"/>
         <c:crosses val="autoZero"/>
         <c:crossBetween val="between"/>
       </c:valAx>
@@ -840,7 +816,7 @@
               <a:cs typeface="+mn-cs"/>
             </a:defRPr>
           </a:pPr>
-          <a:endParaRPr lang="ru-RU"/>
+          <a:endParaRPr lang="en-US"/>
         </a:p>
       </c:txPr>
     </c:legend>
@@ -866,10 +842,10 @@
       <a:pPr>
         <a:defRPr/>
       </a:pPr>
-      <a:endParaRPr lang="ru-RU"/>
+      <a:endParaRPr lang="en-US"/>
     </a:p>
   </c:txPr>
-  <c:externalData r:id="rId3">
+  <c:externalData r:id="rId1">
     <c:autoUpdate val="0"/>
   </c:externalData>
 </c:chartSpace>
@@ -1519,7 +1495,7 @@
           <a:p>
             <a:fld id="{B8532A3A-E1C2-42EA-BDD6-305DAB1834E8}" type="datetimeFigureOut">
               <a:rPr lang="en-US" smtClean="0"/>
-              <a:t>12/7/2018</a:t>
+              <a:t>12/8/18</a:t>
             </a:fld>
             <a:endParaRPr lang="en-US"/>
           </a:p>
@@ -2422,7 +2398,7 @@
           <a:p>
             <a:fld id="{51BBFFC7-5AFF-4374-B478-E246B74FFF84}" type="datetimeFigureOut">
               <a:rPr lang="en-US" smtClean="0"/>
-              <a:t>12/7/2018</a:t>
+              <a:t>12/8/18</a:t>
             </a:fld>
             <a:endParaRPr lang="en-US"/>
           </a:p>
@@ -2592,7 +2568,7 @@
           <a:p>
             <a:fld id="{51BBFFC7-5AFF-4374-B478-E246B74FFF84}" type="datetimeFigureOut">
               <a:rPr lang="en-US" smtClean="0"/>
-              <a:t>12/7/2018</a:t>
+              <a:t>12/8/18</a:t>
             </a:fld>
             <a:endParaRPr lang="en-US"/>
           </a:p>
@@ -2772,7 +2748,7 @@
           <a:p>
             <a:fld id="{51BBFFC7-5AFF-4374-B478-E246B74FFF84}" type="datetimeFigureOut">
               <a:rPr lang="en-US" smtClean="0"/>
-              <a:t>12/7/2018</a:t>
+              <a:t>12/8/18</a:t>
             </a:fld>
             <a:endParaRPr lang="en-US"/>
           </a:p>
@@ -2942,7 +2918,7 @@
           <a:p>
             <a:fld id="{51BBFFC7-5AFF-4374-B478-E246B74FFF84}" type="datetimeFigureOut">
               <a:rPr lang="en-US" smtClean="0"/>
-              <a:t>12/7/2018</a:t>
+              <a:t>12/8/18</a:t>
             </a:fld>
             <a:endParaRPr lang="en-US"/>
           </a:p>
@@ -3188,7 +3164,7 @@
           <a:p>
             <a:fld id="{51BBFFC7-5AFF-4374-B478-E246B74FFF84}" type="datetimeFigureOut">
               <a:rPr lang="en-US" smtClean="0"/>
-              <a:t>12/7/2018</a:t>
+              <a:t>12/8/18</a:t>
             </a:fld>
             <a:endParaRPr lang="en-US"/>
           </a:p>
@@ -3420,7 +3396,7 @@
           <a:p>
             <a:fld id="{51BBFFC7-5AFF-4374-B478-E246B74FFF84}" type="datetimeFigureOut">
               <a:rPr lang="en-US" smtClean="0"/>
-              <a:t>12/7/2018</a:t>
+              <a:t>12/8/18</a:t>
             </a:fld>
             <a:endParaRPr lang="en-US"/>
           </a:p>
@@ -3787,7 +3763,7 @@
           <a:p>
             <a:fld id="{51BBFFC7-5AFF-4374-B478-E246B74FFF84}" type="datetimeFigureOut">
               <a:rPr lang="en-US" smtClean="0"/>
-              <a:t>12/7/2018</a:t>
+              <a:t>12/8/18</a:t>
             </a:fld>
             <a:endParaRPr lang="en-US"/>
           </a:p>
@@ -3905,7 +3881,7 @@
           <a:p>
             <a:fld id="{51BBFFC7-5AFF-4374-B478-E246B74FFF84}" type="datetimeFigureOut">
               <a:rPr lang="en-US" smtClean="0"/>
-              <a:t>12/7/2018</a:t>
+              <a:t>12/8/18</a:t>
             </a:fld>
             <a:endParaRPr lang="en-US"/>
           </a:p>
@@ -4000,7 +3976,7 @@
           <a:p>
             <a:fld id="{51BBFFC7-5AFF-4374-B478-E246B74FFF84}" type="datetimeFigureOut">
               <a:rPr lang="en-US" smtClean="0"/>
-              <a:t>12/7/2018</a:t>
+              <a:t>12/8/18</a:t>
             </a:fld>
             <a:endParaRPr lang="en-US"/>
           </a:p>
@@ -4277,7 +4253,7 @@
           <a:p>
             <a:fld id="{51BBFFC7-5AFF-4374-B478-E246B74FFF84}" type="datetimeFigureOut">
               <a:rPr lang="en-US" smtClean="0"/>
-              <a:t>12/7/2018</a:t>
+              <a:t>12/8/18</a:t>
             </a:fld>
             <a:endParaRPr lang="en-US"/>
           </a:p>
@@ -4530,7 +4506,7 @@
           <a:p>
             <a:fld id="{51BBFFC7-5AFF-4374-B478-E246B74FFF84}" type="datetimeFigureOut">
               <a:rPr lang="en-US" smtClean="0"/>
-              <a:t>12/7/2018</a:t>
+              <a:t>12/8/18</a:t>
             </a:fld>
             <a:endParaRPr lang="en-US"/>
           </a:p>
@@ -4743,7 +4719,7 @@
           <a:p>
             <a:fld id="{51BBFFC7-5AFF-4374-B478-E246B74FFF84}" type="datetimeFigureOut">
               <a:rPr lang="en-US" smtClean="0"/>
-              <a:t>12/7/2018</a:t>
+              <a:t>12/8/18</a:t>
             </a:fld>
             <a:endParaRPr lang="en-US"/>
           </a:p>
@@ -5605,7 +5581,7 @@
   <p:timing>
     <p:tnLst>
       <p:par>
-        <p:cTn id="1" dur="indefinite" restart="never" nodeType="tmRoot"/>
+        <p:cTn xmlns:p14="http://schemas.microsoft.com/office/powerpoint/2010/main" id="1" dur="indefinite" restart="never" nodeType="tmRoot"/>
       </p:par>
     </p:tnLst>
   </p:timing>
@@ -6676,7 +6652,7 @@
   <p:timing>
     <p:tnLst>
       <p:par>
-        <p:cTn id="1" dur="indefinite" restart="never" nodeType="tmRoot"/>
+        <p:cTn xmlns:p14="http://schemas.microsoft.com/office/powerpoint/2010/main" id="1" dur="indefinite" restart="never" nodeType="tmRoot"/>
       </p:par>
     </p:tnLst>
   </p:timing>
@@ -8209,7 +8185,7 @@
   <p:timing>
     <p:tnLst>
       <p:par>
-        <p:cTn id="1" dur="indefinite" restart="never" nodeType="tmRoot"/>
+        <p:cTn xmlns:p14="http://schemas.microsoft.com/office/powerpoint/2010/main" id="1" dur="indefinite" restart="never" nodeType="tmRoot"/>
       </p:par>
     </p:tnLst>
   </p:timing>
@@ -9060,7 +9036,7 @@
   <p:timing>
     <p:tnLst>
       <p:par>
-        <p:cTn id="1" dur="indefinite" restart="never" nodeType="tmRoot"/>
+        <p:cTn xmlns:p14="http://schemas.microsoft.com/office/powerpoint/2010/main" id="1" dur="indefinite" restart="never" nodeType="tmRoot"/>
       </p:par>
     </p:tnLst>
   </p:timing>
@@ -9653,7 +9629,7 @@
   <p:timing>
     <p:tnLst>
       <p:par>
-        <p:cTn id="1" dur="indefinite" restart="never" nodeType="tmRoot"/>
+        <p:cTn xmlns:p14="http://schemas.microsoft.com/office/powerpoint/2010/main" id="1" dur="indefinite" restart="never" nodeType="tmRoot"/>
       </p:par>
     </p:tnLst>
   </p:timing>
@@ -9918,7 +9894,7 @@
   <p:timing>
     <p:tnLst>
       <p:par>
-        <p:cTn id="1" dur="indefinite" restart="never" nodeType="tmRoot"/>
+        <p:cTn xmlns:p14="http://schemas.microsoft.com/office/powerpoint/2010/main" id="1" dur="indefinite" restart="never" nodeType="tmRoot"/>
       </p:par>
     </p:tnLst>
   </p:timing>
@@ -10317,7 +10293,7 @@
   <p:timing>
     <p:tnLst>
       <p:par>
-        <p:cTn id="1" dur="indefinite" restart="never" nodeType="tmRoot"/>
+        <p:cTn xmlns:p14="http://schemas.microsoft.com/office/powerpoint/2010/main" id="1" dur="indefinite" restart="never" nodeType="tmRoot"/>
       </p:par>
     </p:tnLst>
   </p:timing>
@@ -11394,7 +11370,7 @@
   <p:timing>
     <p:tnLst>
       <p:par>
-        <p:cTn id="1" dur="indefinite" restart="never" nodeType="tmRoot"/>
+        <p:cTn xmlns:p14="http://schemas.microsoft.com/office/powerpoint/2010/main" id="1" dur="indefinite" restart="never" nodeType="tmRoot"/>
       </p:par>
     </p:tnLst>
   </p:timing>
@@ -11856,463 +11832,7 @@
   <p:timing>
     <p:tnLst>
       <p:par>
-        <p:cTn id="1" dur="indefinite" restart="never" nodeType="tmRoot"/>
-      </p:par>
-    </p:tnLst>
-  </p:timing>
-</p:sld>
-</file>
-
-<file path=ppt/slides/slide18.xml><?xml version="1.0" encoding="utf-8"?>
-<p:sld xmlns:a="http://schemas.openxmlformats.org/drawingml/2006/main" xmlns:r="http://schemas.openxmlformats.org/officeDocument/2006/relationships" xmlns:p="http://schemas.openxmlformats.org/presentationml/2006/main">
-  <p:cSld>
-    <p:bg>
-      <p:bgPr>
-        <a:solidFill>
-          <a:srgbClr val="444444"/>
-        </a:solidFill>
-        <a:effectLst/>
-      </p:bgPr>
-    </p:bg>
-    <p:spTree>
-      <p:nvGrpSpPr>
-        <p:cNvPr id="1" name=""/>
-        <p:cNvGrpSpPr/>
-        <p:nvPr/>
-      </p:nvGrpSpPr>
-      <p:grpSpPr>
-        <a:xfrm>
-          <a:off x="0" y="0"/>
-          <a:ext cx="0" cy="0"/>
-          <a:chOff x="0" y="0"/>
-          <a:chExt cx="0" cy="0"/>
-        </a:xfrm>
-      </p:grpSpPr>
-      <p:sp>
-        <p:nvSpPr>
-          <p:cNvPr id="2" name="Title 1"/>
-          <p:cNvSpPr>
-            <a:spLocks noGrp="1"/>
-          </p:cNvSpPr>
-          <p:nvPr>
-            <p:ph type="title"/>
-          </p:nvPr>
-        </p:nvSpPr>
-        <p:spPr>
-          <a:xfrm>
-            <a:off x="824459" y="365126"/>
-            <a:ext cx="10529341" cy="712904"/>
-          </a:xfrm>
-        </p:spPr>
-        <p:txBody>
-          <a:bodyPr/>
-          <a:lstStyle/>
-          <a:p>
-            <a:pPr algn="ctr"/>
-            <a:r>
-              <a:rPr lang="en-US" dirty="0" smtClean="0">
-                <a:solidFill>
-                  <a:srgbClr val="FFFF00"/>
-                </a:solidFill>
-              </a:rPr>
-              <a:t>Image Tips</a:t>
-            </a:r>
-            <a:endParaRPr lang="en-US" dirty="0">
-              <a:solidFill>
-                <a:srgbClr val="FFFF00"/>
-              </a:solidFill>
-            </a:endParaRPr>
-          </a:p>
-        </p:txBody>
-      </p:sp>
-      <p:sp>
-        <p:nvSpPr>
-          <p:cNvPr id="3" name="Content Placeholder 2"/>
-          <p:cNvSpPr>
-            <a:spLocks noGrp="1"/>
-          </p:cNvSpPr>
-          <p:nvPr>
-            <p:ph idx="1"/>
-          </p:nvPr>
-        </p:nvSpPr>
-        <p:spPr>
-          <a:xfrm>
-            <a:off x="0" y="1406012"/>
-            <a:ext cx="12192000" cy="5451987"/>
-          </a:xfrm>
-          <a:solidFill>
-            <a:schemeClr val="bg1">
-              <a:lumMod val="85000"/>
-              <a:alpha val="90000"/>
-            </a:schemeClr>
-          </a:solidFill>
-        </p:spPr>
-        <p:txBody>
-          <a:bodyPr>
-            <a:normAutofit/>
-          </a:bodyPr>
-          <a:lstStyle/>
-          <a:p>
-            <a:r>
-              <a:rPr lang="en-US" sz="2400" dirty="0" smtClean="0"/>
-              <a:t>Image Removal &amp; Modifications:</a:t>
-            </a:r>
-          </a:p>
-          <a:p>
-            <a:pPr marL="0" indent="0">
-              <a:buNone/>
-            </a:pPr>
-            <a:r>
-              <a:rPr lang="en-US" sz="2000" b="1" dirty="0" smtClean="0"/>
-              <a:t>Background Images:</a:t>
-            </a:r>
-          </a:p>
-          <a:p>
-            <a:pPr marL="0" indent="0">
-              <a:buNone/>
-            </a:pPr>
-            <a:r>
-              <a:rPr lang="en-US" sz="1600" dirty="0" smtClean="0"/>
-              <a:t>Many of our slides have background images, which you may want to replace or remove to fit your needs. To modify, right click the slide (in the left preview panel) and choose “format background” from the dropdown menu. A “format background” screen will open to the right of the slide. To replace image, choose “file” from the insert section to browse your computer, or “online” to search the internet.</a:t>
-            </a:r>
-          </a:p>
-          <a:p>
-            <a:pPr marL="0" indent="0">
-              <a:buNone/>
-            </a:pPr>
-            <a:r>
-              <a:rPr lang="en-US" sz="2000" b="1" dirty="0" smtClean="0"/>
-              <a:t>Smaller Images in Content:</a:t>
-            </a:r>
-          </a:p>
-          <a:p>
-            <a:pPr marL="0" indent="0">
-              <a:buNone/>
-            </a:pPr>
-            <a:r>
-              <a:rPr lang="en-US" sz="1600" dirty="0" smtClean="0"/>
-              <a:t>Simply right click the image and choose the “change picture” option, and it will give you options to browse your computer or search online.</a:t>
-            </a:r>
-          </a:p>
-          <a:p>
-            <a:pPr marL="0" indent="0">
-              <a:buNone/>
-            </a:pPr>
-            <a:r>
-              <a:rPr lang="en-US" sz="2000" b="1" dirty="0" smtClean="0"/>
-              <a:t>Color Transparency Screen:</a:t>
-            </a:r>
-          </a:p>
-          <a:p>
-            <a:pPr marL="0" indent="0">
-              <a:buNone/>
-            </a:pPr>
-            <a:r>
-              <a:rPr lang="en-US" sz="1600" dirty="0" smtClean="0"/>
-              <a:t>Many slides have colored screen with varying transparency levels to give color to the slide and allow text on slide to be seen better. This is usually placed at the back of the slide, just in front of the background image. To modify color or change transparency, right click in the slide somewhere that does not have text or objects. Then choose ‘format shape” from the dropdown box. You will now see a color selector box and transparency options to the right. Make changes to get the desired results you are looking for. If you want to just remove this screen, choose “cut” from the dropdown menu when you right click it.</a:t>
-            </a:r>
-          </a:p>
-          <a:p>
-            <a:pPr marL="0" indent="0">
-              <a:buNone/>
-            </a:pPr>
-            <a:r>
-              <a:rPr lang="en-US" sz="2000" b="1" dirty="0" smtClean="0"/>
-              <a:t>Image Usage Rights:</a:t>
-            </a:r>
-            <a:endParaRPr lang="en-US" sz="2000" b="1" dirty="0"/>
-          </a:p>
-          <a:p>
-            <a:pPr marL="0" indent="0">
-              <a:buNone/>
-            </a:pPr>
-            <a:r>
-              <a:rPr lang="en-US" sz="1600" dirty="0" smtClean="0"/>
-              <a:t>Most of our images are licensed through Shutterstock, for use within our PowerPoint Templates only. You are free to modify and transfer photos between our templates, but use outside our templates could constitute a copyright violation. </a:t>
-            </a:r>
-            <a:r>
-              <a:rPr lang="en-US" sz="1600" dirty="0"/>
-              <a:t>By providing these PowerPoint Templates to you, we are not transferring any of our licensing of images to be used outside these </a:t>
-            </a:r>
-            <a:r>
-              <a:rPr lang="en-US" sz="1600" dirty="0" smtClean="0"/>
-              <a:t>templates.</a:t>
-            </a:r>
-          </a:p>
-        </p:txBody>
-      </p:sp>
-      <p:sp>
-        <p:nvSpPr>
-          <p:cNvPr id="7" name="TextBox 6"/>
-          <p:cNvSpPr txBox="1"/>
-          <p:nvPr/>
-        </p:nvSpPr>
-        <p:spPr>
-          <a:xfrm>
-            <a:off x="11731397" y="6704111"/>
-            <a:ext cx="329610" cy="107722"/>
-          </a:xfrm>
-          <a:prstGeom prst="rect">
-            <a:avLst/>
-          </a:prstGeom>
-          <a:noFill/>
-        </p:spPr>
-        <p:txBody>
-          <a:bodyPr wrap="square" rtlCol="0">
-            <a:spAutoFit/>
-          </a:bodyPr>
-          <a:lstStyle/>
-          <a:p>
-            <a:r>
-              <a:rPr lang="en-US" sz="100" dirty="0" smtClean="0">
-                <a:solidFill>
-                  <a:schemeClr val="bg1">
-                    <a:lumMod val="75000"/>
-                  </a:schemeClr>
-                </a:solidFill>
-                <a:hlinkClick r:id="rId2"/>
-              </a:rPr>
-              <a:t>Free PowerPoint Templates</a:t>
-            </a:r>
-            <a:endParaRPr lang="en-US" sz="100" dirty="0">
-              <a:solidFill>
-                <a:schemeClr val="bg1">
-                  <a:lumMod val="75000"/>
-                </a:schemeClr>
-              </a:solidFill>
-            </a:endParaRPr>
-          </a:p>
-        </p:txBody>
-      </p:sp>
-    </p:spTree>
-    <p:extLst>
-      <p:ext uri="{BB962C8B-B14F-4D97-AF65-F5344CB8AC3E}">
-        <p14:creationId xmlns:p14="http://schemas.microsoft.com/office/powerpoint/2010/main" val="3859369620"/>
-      </p:ext>
-    </p:extLst>
-  </p:cSld>
-  <p:clrMapOvr>
-    <a:masterClrMapping/>
-  </p:clrMapOvr>
-  <p:timing>
-    <p:tnLst>
-      <p:par>
-        <p:cTn id="1" dur="indefinite" restart="never" nodeType="tmRoot"/>
-      </p:par>
-    </p:tnLst>
-  </p:timing>
-</p:sld>
-</file>
-
-<file path=ppt/slides/slide19.xml><?xml version="1.0" encoding="utf-8"?>
-<p:sld xmlns:a="http://schemas.openxmlformats.org/drawingml/2006/main" xmlns:r="http://schemas.openxmlformats.org/officeDocument/2006/relationships" xmlns:p="http://schemas.openxmlformats.org/presentationml/2006/main">
-  <p:cSld>
-    <p:bg>
-      <p:bgPr>
-        <a:solidFill>
-          <a:srgbClr val="444444"/>
-        </a:solidFill>
-        <a:effectLst/>
-      </p:bgPr>
-    </p:bg>
-    <p:spTree>
-      <p:nvGrpSpPr>
-        <p:cNvPr id="1" name=""/>
-        <p:cNvGrpSpPr/>
-        <p:nvPr/>
-      </p:nvGrpSpPr>
-      <p:grpSpPr>
-        <a:xfrm>
-          <a:off x="0" y="0"/>
-          <a:ext cx="0" cy="0"/>
-          <a:chOff x="0" y="0"/>
-          <a:chExt cx="0" cy="0"/>
-        </a:xfrm>
-      </p:grpSpPr>
-      <p:sp>
-        <p:nvSpPr>
-          <p:cNvPr id="2" name="Title 1"/>
-          <p:cNvSpPr>
-            <a:spLocks noGrp="1"/>
-          </p:cNvSpPr>
-          <p:nvPr>
-            <p:ph type="title"/>
-          </p:nvPr>
-        </p:nvSpPr>
-        <p:spPr>
-          <a:xfrm>
-            <a:off x="824459" y="365126"/>
-            <a:ext cx="10529341" cy="712904"/>
-          </a:xfrm>
-        </p:spPr>
-        <p:txBody>
-          <a:bodyPr/>
-          <a:lstStyle/>
-          <a:p>
-            <a:pPr algn="ctr"/>
-            <a:r>
-              <a:rPr lang="en-US" dirty="0">
-                <a:solidFill>
-                  <a:srgbClr val="FFFF00"/>
-                </a:solidFill>
-              </a:rPr>
-              <a:t>T</a:t>
-            </a:r>
-            <a:r>
-              <a:rPr lang="en-US" dirty="0" smtClean="0">
-                <a:solidFill>
-                  <a:srgbClr val="FFFF00"/>
-                </a:solidFill>
-              </a:rPr>
-              <a:t>ransitions</a:t>
-            </a:r>
-            <a:endParaRPr lang="en-US" dirty="0">
-              <a:solidFill>
-                <a:srgbClr val="FFFF00"/>
-              </a:solidFill>
-            </a:endParaRPr>
-          </a:p>
-        </p:txBody>
-      </p:sp>
-      <p:sp>
-        <p:nvSpPr>
-          <p:cNvPr id="3" name="Content Placeholder 2"/>
-          <p:cNvSpPr>
-            <a:spLocks noGrp="1"/>
-          </p:cNvSpPr>
-          <p:nvPr>
-            <p:ph idx="1"/>
-          </p:nvPr>
-        </p:nvSpPr>
-        <p:spPr>
-          <a:xfrm>
-            <a:off x="0" y="1406013"/>
-            <a:ext cx="12192000" cy="5251932"/>
-          </a:xfrm>
-          <a:solidFill>
-            <a:schemeClr val="bg1">
-              <a:lumMod val="85000"/>
-              <a:alpha val="90000"/>
-            </a:schemeClr>
-          </a:solidFill>
-        </p:spPr>
-        <p:txBody>
-          <a:bodyPr>
-            <a:normAutofit/>
-          </a:bodyPr>
-          <a:lstStyle/>
-          <a:p>
-            <a:pPr marL="0" indent="0">
-              <a:buNone/>
-            </a:pPr>
-            <a:endParaRPr lang="en-US" sz="2000" dirty="0" smtClean="0"/>
-          </a:p>
-          <a:p>
-            <a:pPr marL="0" indent="0">
-              <a:buNone/>
-            </a:pPr>
-            <a:r>
-              <a:rPr lang="en-US" sz="2000" dirty="0" smtClean="0"/>
-              <a:t>Some of our templates have transitions (graphic effects on slide change). To see if a template has transitions or how it would look in presentation mode, click the </a:t>
-            </a:r>
-            <a:r>
-              <a:rPr lang="en-US" sz="2000" dirty="0" smtClean="0">
-                <a:solidFill>
-                  <a:srgbClr val="0070C0"/>
-                </a:solidFill>
-              </a:rPr>
-              <a:t>View&gt;Reading View </a:t>
-            </a:r>
-            <a:r>
-              <a:rPr lang="en-US" sz="2000" dirty="0" smtClean="0"/>
-              <a:t>options on the menu above. If you want to add, remove or modify transitions, click the slide, then click the </a:t>
-            </a:r>
-            <a:r>
-              <a:rPr lang="en-US" sz="2000" dirty="0">
-                <a:solidFill>
-                  <a:srgbClr val="0070C0"/>
-                </a:solidFill>
-              </a:rPr>
-              <a:t>T</a:t>
-            </a:r>
-            <a:r>
-              <a:rPr lang="en-US" sz="2000" dirty="0" smtClean="0">
-                <a:solidFill>
-                  <a:srgbClr val="0070C0"/>
-                </a:solidFill>
-              </a:rPr>
-              <a:t>ransitions</a:t>
-            </a:r>
-            <a:r>
-              <a:rPr lang="en-US" sz="2000" dirty="0" smtClean="0"/>
-              <a:t> tab at top of page. Select “none” to remove, or select the appropriate effect to add/modify. This must be done to each slide, as changes only affect the slide you are currently working on.</a:t>
-            </a:r>
-          </a:p>
-          <a:p>
-            <a:pPr marL="0" indent="0">
-              <a:buNone/>
-            </a:pPr>
-            <a:endParaRPr lang="en-US" sz="2000" dirty="0" smtClean="0"/>
-          </a:p>
-        </p:txBody>
-      </p:sp>
-      <p:sp>
-        <p:nvSpPr>
-          <p:cNvPr id="7" name="TextBox 6"/>
-          <p:cNvSpPr txBox="1"/>
-          <p:nvPr/>
-        </p:nvSpPr>
-        <p:spPr>
-          <a:xfrm>
-            <a:off x="11731397" y="6704111"/>
-            <a:ext cx="329610" cy="107722"/>
-          </a:xfrm>
-          <a:prstGeom prst="rect">
-            <a:avLst/>
-          </a:prstGeom>
-          <a:noFill/>
-        </p:spPr>
-        <p:txBody>
-          <a:bodyPr wrap="square" rtlCol="0">
-            <a:spAutoFit/>
-          </a:bodyPr>
-          <a:lstStyle/>
-          <a:p>
-            <a:r>
-              <a:rPr lang="en-US" sz="100" dirty="0" smtClean="0">
-                <a:solidFill>
-                  <a:schemeClr val="bg1">
-                    <a:lumMod val="75000"/>
-                  </a:schemeClr>
-                </a:solidFill>
-                <a:hlinkClick r:id="rId2"/>
-              </a:rPr>
-              <a:t>Free PowerPoint Templates</a:t>
-            </a:r>
-            <a:endParaRPr lang="en-US" sz="100" dirty="0">
-              <a:solidFill>
-                <a:schemeClr val="bg1">
-                  <a:lumMod val="75000"/>
-                </a:schemeClr>
-              </a:solidFill>
-            </a:endParaRPr>
-          </a:p>
-        </p:txBody>
-      </p:sp>
-    </p:spTree>
-    <p:extLst>
-      <p:ext uri="{BB962C8B-B14F-4D97-AF65-F5344CB8AC3E}">
-        <p14:creationId xmlns:p14="http://schemas.microsoft.com/office/powerpoint/2010/main" val="2848256944"/>
-      </p:ext>
-    </p:extLst>
-  </p:cSld>
-  <p:clrMapOvr>
-    <a:masterClrMapping/>
-  </p:clrMapOvr>
-  <p:timing>
-    <p:tnLst>
-      <p:par>
-        <p:cTn id="1" dur="indefinite" restart="never" nodeType="tmRoot"/>
+        <p:cTn xmlns:p14="http://schemas.microsoft.com/office/powerpoint/2010/main" id="1" dur="indefinite" restart="never" nodeType="tmRoot"/>
       </p:par>
     </p:tnLst>
   </p:timing>
@@ -12504,7 +12024,7 @@
         </p:blipFill>
         <p:spPr>
           <a:xfrm>
-            <a:off x="413793" y="3996745"/>
+            <a:off x="0" y="2781173"/>
             <a:ext cx="1130951" cy="961792"/>
           </a:xfrm>
           <a:prstGeom prst="rect">
@@ -12577,14 +12097,14 @@
           <p:nvPr>
             <p:extLst>
               <p:ext uri="{D42A27DB-BD31-4B8C-83A1-F6EECF244321}">
-                <p14:modId xmlns:p14="http://schemas.microsoft.com/office/powerpoint/2010/main" val="2864866865"/>
+                <p14:modId xmlns:p14="http://schemas.microsoft.com/office/powerpoint/2010/main" val="871539035"/>
               </p:ext>
             </p:extLst>
           </p:nvPr>
         </p:nvGraphicFramePr>
         <p:xfrm>
-          <a:off x="2823356" y="3146723"/>
-          <a:ext cx="9100391" cy="3880940"/>
+          <a:off x="2873895" y="2765723"/>
+          <a:ext cx="9100391" cy="3896180"/>
         </p:xfrm>
         <a:graphic>
           <a:graphicData uri="http://schemas.openxmlformats.org/drawingml/2006/table">
@@ -12596,21 +12116,21 @@
                 <a:gridCol w="2216295">
                   <a:extLst>
                     <a:ext uri="{9D8B030D-6E8A-4147-A177-3AD203B41FA5}">
-                      <a16:colId xmlns:a16="http://schemas.microsoft.com/office/drawing/2014/main" val="20000"/>
+                      <a16:colId xmlns:a16="http://schemas.microsoft.com/office/drawing/2014/main" xmlns="" val="20000"/>
                     </a:ext>
                   </a:extLst>
                 </a:gridCol>
                 <a:gridCol w="4640766">
                   <a:extLst>
                     <a:ext uri="{9D8B030D-6E8A-4147-A177-3AD203B41FA5}">
-                      <a16:colId xmlns:a16="http://schemas.microsoft.com/office/drawing/2014/main" val="20001"/>
+                      <a16:colId xmlns:a16="http://schemas.microsoft.com/office/drawing/2014/main" xmlns="" val="20001"/>
                     </a:ext>
                   </a:extLst>
                 </a:gridCol>
                 <a:gridCol w="2243330">
                   <a:extLst>
                     <a:ext uri="{9D8B030D-6E8A-4147-A177-3AD203B41FA5}">
-                      <a16:colId xmlns:a16="http://schemas.microsoft.com/office/drawing/2014/main" val="20002"/>
+                      <a16:colId xmlns:a16="http://schemas.microsoft.com/office/drawing/2014/main" xmlns="" val="20002"/>
                     </a:ext>
                   </a:extLst>
                 </a:gridCol>
@@ -12797,7 +12317,7 @@
                 </a:tc>
                 <a:extLst>
                   <a:ext uri="{0D108BD9-81ED-4DB2-BD59-A6C34878D82A}">
-                    <a16:rowId xmlns:a16="http://schemas.microsoft.com/office/drawing/2014/main" val="10000"/>
+                    <a16:rowId xmlns:a16="http://schemas.microsoft.com/office/drawing/2014/main" xmlns="" val="10000"/>
                   </a:ext>
                 </a:extLst>
               </a:tr>
@@ -12904,7 +12424,7 @@
                         </a:spcAft>
                       </a:pPr>
                       <a:r>
-                        <a:rPr lang="en-US" sz="1700" dirty="0" smtClean="0">
+                        <a:rPr lang="en-US" sz="1700" dirty="0" err="1" smtClean="0">
                           <a:solidFill>
                             <a:schemeClr val="bg1"/>
                           </a:solidFill>
@@ -12912,15 +12432,43 @@
                           <a:ea typeface="Times New Roman"/>
                           <a:cs typeface="Arial" pitchFamily="34" charset="0"/>
                         </a:rPr>
-                        <a:t>Player, Opponent and Summary</a:t>
+                        <a:t>Introduction,Questions</a:t>
                       </a:r>
+                      <a:endParaRPr lang="en-US" sz="1700" dirty="0" smtClean="0">
+                        <a:solidFill>
+                          <a:schemeClr val="bg1"/>
+                        </a:solidFill>
+                        <a:latin typeface="Arial" pitchFamily="34" charset="0"/>
+                        <a:ea typeface="Times New Roman"/>
+                        <a:cs typeface="Arial" pitchFamily="34" charset="0"/>
+                      </a:endParaRPr>
                     </a:p>
                     <a:p>
-                      <a:pPr>
+                      <a:pPr marL="0" marR="0" indent="0" algn="l" defTabSz="914400" rtl="0" eaLnBrk="1" fontAlgn="auto" latinLnBrk="0" hangingPunct="1">
+                        <a:lnSpc>
+                          <a:spcPct val="100000"/>
+                        </a:lnSpc>
+                        <a:spcBef>
+                          <a:spcPts val="0"/>
+                        </a:spcBef>
                         <a:spcAft>
                           <a:spcPts val="0"/>
                         </a:spcAft>
+                        <a:buClrTx/>
+                        <a:buSzTx/>
+                        <a:buFontTx/>
+                        <a:buNone/>
+                        <a:tabLst/>
+                        <a:defRPr/>
                       </a:pPr>
+                      <a:r>
+                        <a:rPr lang="en-US" sz="1600" dirty="0" smtClean="0">
+                          <a:solidFill>
+                            <a:schemeClr val="bg1"/>
+                          </a:solidFill>
+                        </a:rPr>
+                        <a:t>Overview,</a:t>
+                      </a:r>
                       <a:r>
                         <a:rPr lang="en-US" sz="1700" dirty="0" smtClean="0">
                           <a:solidFill>
@@ -12930,7 +12478,7 @@
                           <a:ea typeface="Times New Roman"/>
                           <a:cs typeface="Arial" pitchFamily="34" charset="0"/>
                         </a:rPr>
-                        <a:t>Introduction and Questions</a:t>
+                        <a:t> Quest </a:t>
                       </a:r>
                     </a:p>
                     <a:p>
@@ -12939,14 +12487,6 @@
                           <a:spcPts val="0"/>
                         </a:spcAft>
                       </a:pPr>
-                      <a:r>
-                        <a:rPr lang="en-US" sz="1600" dirty="0" smtClean="0">
-                          <a:solidFill>
-                            <a:schemeClr val="bg1"/>
-                          </a:solidFill>
-                        </a:rPr>
-                        <a:t>Game Description: Overview</a:t>
-                      </a:r>
                       <a:endParaRPr lang="en-US" sz="1700" dirty="0">
                         <a:solidFill>
                           <a:schemeClr val="bg1"/>
@@ -13060,7 +12600,7 @@
                 </a:tc>
                 <a:extLst>
                   <a:ext uri="{0D108BD9-81ED-4DB2-BD59-A6C34878D82A}">
-                    <a16:rowId xmlns:a16="http://schemas.microsoft.com/office/drawing/2014/main" val="10001"/>
+                    <a16:rowId xmlns:a16="http://schemas.microsoft.com/office/drawing/2014/main" xmlns="" val="10001"/>
                   </a:ext>
                 </a:extLst>
               </a:tr>
@@ -13319,7 +12859,7 @@
                 </a:tc>
                 <a:extLst>
                   <a:ext uri="{0D108BD9-81ED-4DB2-BD59-A6C34878D82A}">
-                    <a16:rowId xmlns:a16="http://schemas.microsoft.com/office/drawing/2014/main" val="10002"/>
+                    <a16:rowId xmlns:a16="http://schemas.microsoft.com/office/drawing/2014/main" xmlns="" val="10002"/>
                   </a:ext>
                 </a:extLst>
               </a:tr>
@@ -13530,7 +13070,7 @@
                 </a:tc>
                 <a:extLst>
                   <a:ext uri="{0D108BD9-81ED-4DB2-BD59-A6C34878D82A}">
-                    <a16:rowId xmlns:a16="http://schemas.microsoft.com/office/drawing/2014/main" val="10003"/>
+                    <a16:rowId xmlns:a16="http://schemas.microsoft.com/office/drawing/2014/main" xmlns="" val="10003"/>
                   </a:ext>
                 </a:extLst>
               </a:tr>
@@ -13754,7 +13294,7 @@
                 </a:tc>
                 <a:extLst>
                   <a:ext uri="{0D108BD9-81ED-4DB2-BD59-A6C34878D82A}">
-                    <a16:rowId xmlns:a16="http://schemas.microsoft.com/office/drawing/2014/main" val="10004"/>
+                    <a16:rowId xmlns:a16="http://schemas.microsoft.com/office/drawing/2014/main" xmlns="" val="10004"/>
                   </a:ext>
                 </a:extLst>
               </a:tr>
@@ -13762,45 +13302,6 @@
           </a:graphicData>
         </a:graphic>
       </p:graphicFrame>
-      <p:sp>
-        <p:nvSpPr>
-          <p:cNvPr id="2" name="Rectangle 1"/>
-          <p:cNvSpPr/>
-          <p:nvPr/>
-        </p:nvSpPr>
-        <p:spPr>
-          <a:xfrm>
-            <a:off x="3399845" y="282278"/>
-            <a:ext cx="7177210" cy="769441"/>
-          </a:xfrm>
-          <a:prstGeom prst="rect">
-            <a:avLst/>
-          </a:prstGeom>
-        </p:spPr>
-        <p:txBody>
-          <a:bodyPr wrap="square">
-            <a:spAutoFit/>
-          </a:bodyPr>
-          <a:lstStyle/>
-          <a:p>
-            <a:r>
-              <a:rPr lang="en-US" sz="4400" dirty="0">
-                <a:solidFill>
-                  <a:schemeClr val="bg1"/>
-                </a:solidFill>
-                <a:latin typeface="Arial" pitchFamily="34" charset="0"/>
-                <a:cs typeface="Arial" pitchFamily="34" charset="0"/>
-              </a:rPr>
-              <a:t>Team contribution</a:t>
-            </a:r>
-            <a:endParaRPr lang="ru-RU" sz="4400" dirty="0">
-              <a:solidFill>
-                <a:schemeClr val="bg1"/>
-              </a:solidFill>
-            </a:endParaRPr>
-          </a:p>
-        </p:txBody>
-      </p:sp>
       <p:sp>
         <p:nvSpPr>
           <p:cNvPr id="30" name="Rectangle 29"/>
@@ -13857,6 +13358,61 @@
             <a:endParaRPr lang="en-US" sz="3000" dirty="0">
               <a:solidFill>
                 <a:schemeClr val="tx1"/>
+              </a:solidFill>
+            </a:endParaRPr>
+          </a:p>
+        </p:txBody>
+      </p:sp>
+      <p:sp>
+        <p:nvSpPr>
+          <p:cNvPr id="9" name="TextBox 8"/>
+          <p:cNvSpPr txBox="1"/>
+          <p:nvPr/>
+        </p:nvSpPr>
+        <p:spPr>
+          <a:xfrm>
+            <a:off x="0" y="907144"/>
+            <a:ext cx="12192000" cy="707886"/>
+          </a:xfrm>
+          <a:prstGeom prst="rect">
+            <a:avLst/>
+          </a:prstGeom>
+          <a:solidFill>
+            <a:schemeClr val="accent1">
+              <a:alpha val="30000"/>
+            </a:schemeClr>
+          </a:solidFill>
+        </p:spPr>
+        <p:txBody>
+          <a:bodyPr wrap="square" rtlCol="0">
+            <a:spAutoFit/>
+          </a:bodyPr>
+          <a:lstStyle/>
+          <a:p>
+            <a:pPr algn="ctr"/>
+            <a:r>
+              <a:rPr lang="en-US" sz="4000" dirty="0">
+                <a:solidFill>
+                  <a:schemeClr val="bg1"/>
+                </a:solidFill>
+                <a:latin typeface="Arial" pitchFamily="34" charset="0"/>
+                <a:cs typeface="Arial" pitchFamily="34" charset="0"/>
+              </a:rPr>
+              <a:t>Team </a:t>
+            </a:r>
+            <a:r>
+              <a:rPr lang="en-US" sz="4000" dirty="0" smtClean="0">
+                <a:solidFill>
+                  <a:schemeClr val="bg1"/>
+                </a:solidFill>
+                <a:latin typeface="Arial" pitchFamily="34" charset="0"/>
+                <a:cs typeface="Arial" pitchFamily="34" charset="0"/>
+              </a:rPr>
+              <a:t>contribution</a:t>
+            </a:r>
+            <a:endParaRPr lang="ru-RU" sz="4000" dirty="0">
+              <a:solidFill>
+                <a:schemeClr val="bg1"/>
               </a:solidFill>
             </a:endParaRPr>
           </a:p>
@@ -13887,565 +13443,7 @@
   <p:timing>
     <p:tnLst>
       <p:par>
-        <p:cTn id="1" dur="indefinite" restart="never" nodeType="tmRoot"/>
-      </p:par>
-    </p:tnLst>
-  </p:timing>
-</p:sld>
-</file>
-
-<file path=ppt/slides/slide20.xml><?xml version="1.0" encoding="utf-8"?>
-<p:sld xmlns:a="http://schemas.openxmlformats.org/drawingml/2006/main" xmlns:r="http://schemas.openxmlformats.org/officeDocument/2006/relationships" xmlns:p="http://schemas.openxmlformats.org/presentationml/2006/main">
-  <p:cSld>
-    <p:bg>
-      <p:bgPr>
-        <a:solidFill>
-          <a:srgbClr val="444444"/>
-        </a:solidFill>
-        <a:effectLst/>
-      </p:bgPr>
-    </p:bg>
-    <p:spTree>
-      <p:nvGrpSpPr>
-        <p:cNvPr id="1" name=""/>
-        <p:cNvGrpSpPr/>
-        <p:nvPr/>
-      </p:nvGrpSpPr>
-      <p:grpSpPr>
-        <a:xfrm>
-          <a:off x="0" y="0"/>
-          <a:ext cx="0" cy="0"/>
-          <a:chOff x="0" y="0"/>
-          <a:chExt cx="0" cy="0"/>
-        </a:xfrm>
-      </p:grpSpPr>
-      <p:sp>
-        <p:nvSpPr>
-          <p:cNvPr id="2" name="Title 1"/>
-          <p:cNvSpPr>
-            <a:spLocks noGrp="1"/>
-          </p:cNvSpPr>
-          <p:nvPr>
-            <p:ph type="title"/>
-          </p:nvPr>
-        </p:nvSpPr>
-        <p:spPr>
-          <a:xfrm>
-            <a:off x="824459" y="365126"/>
-            <a:ext cx="10529341" cy="712904"/>
-          </a:xfrm>
-        </p:spPr>
-        <p:txBody>
-          <a:bodyPr>
-            <a:normAutofit/>
-          </a:bodyPr>
-          <a:lstStyle/>
-          <a:p>
-            <a:pPr algn="ctr"/>
-            <a:r>
-              <a:rPr lang="en-US" sz="4000" u="sng" dirty="0" smtClean="0">
-                <a:solidFill>
-                  <a:srgbClr val="FFFF00"/>
-                </a:solidFill>
-              </a:rPr>
-              <a:t>Please Support Our Free </a:t>
-            </a:r>
-            <a:r>
-              <a:rPr lang="en-US" sz="4000" u="sng" dirty="0">
-                <a:solidFill>
-                  <a:srgbClr val="FFFF00"/>
-                </a:solidFill>
-              </a:rPr>
-              <a:t>T</a:t>
-            </a:r>
-            <a:r>
-              <a:rPr lang="en-US" sz="4000" u="sng" dirty="0" smtClean="0">
-                <a:solidFill>
-                  <a:srgbClr val="FFFF00"/>
-                </a:solidFill>
-              </a:rPr>
-              <a:t>emplate Service!</a:t>
-            </a:r>
-            <a:endParaRPr lang="en-US" sz="4000" u="sng" dirty="0">
-              <a:solidFill>
-                <a:srgbClr val="FFFF00"/>
-              </a:solidFill>
-            </a:endParaRPr>
-          </a:p>
-        </p:txBody>
-      </p:sp>
-      <p:sp>
-        <p:nvSpPr>
-          <p:cNvPr id="3" name="Content Placeholder 2"/>
-          <p:cNvSpPr>
-            <a:spLocks noGrp="1"/>
-          </p:cNvSpPr>
-          <p:nvPr>
-            <p:ph idx="1"/>
-          </p:nvPr>
-        </p:nvSpPr>
-        <p:spPr>
-          <a:xfrm>
-            <a:off x="0" y="1406013"/>
-            <a:ext cx="12192000" cy="5251932"/>
-          </a:xfrm>
-          <a:solidFill>
-            <a:schemeClr val="bg1">
-              <a:lumMod val="85000"/>
-              <a:alpha val="90000"/>
-            </a:schemeClr>
-          </a:solidFill>
-        </p:spPr>
-        <p:txBody>
-          <a:bodyPr>
-            <a:normAutofit/>
-          </a:bodyPr>
-          <a:lstStyle/>
-          <a:p>
-            <a:pPr marL="0" indent="0">
-              <a:buNone/>
-            </a:pPr>
-            <a:endParaRPr lang="en-US" sz="2000" dirty="0" smtClean="0"/>
-          </a:p>
-          <a:p>
-            <a:pPr marL="0" indent="0">
-              <a:buNone/>
-            </a:pPr>
-            <a:r>
-              <a:rPr lang="en-US" sz="2000" dirty="0" smtClean="0"/>
-              <a:t>We are a free service, and we will never ask for money. We do however ask that you support us by letting others know about our free service. We maintain operations through advertisements on the site, and the more people who visit our site, the easier it will be for us to maintain costs for servers, continue new developments, etc. </a:t>
-            </a:r>
-          </a:p>
-          <a:p>
-            <a:pPr marL="0" indent="0">
-              <a:buNone/>
-            </a:pPr>
-            <a:endParaRPr lang="en-US" sz="2000" dirty="0"/>
-          </a:p>
-          <a:p>
-            <a:pPr marL="0" indent="0">
-              <a:buNone/>
-            </a:pPr>
-            <a:r>
-              <a:rPr lang="en-US" sz="2000" dirty="0" smtClean="0"/>
-              <a:t>There are many ways to help get the word out:</a:t>
-            </a:r>
-          </a:p>
-          <a:p>
-            <a:pPr marL="457200" indent="-457200">
-              <a:buAutoNum type="arabicParenR"/>
-            </a:pPr>
-            <a:r>
-              <a:rPr lang="en-US" sz="2000" dirty="0" smtClean="0"/>
-              <a:t>Social media likes and shares.</a:t>
-            </a:r>
-          </a:p>
-          <a:p>
-            <a:pPr marL="457200" indent="-457200">
-              <a:buAutoNum type="arabicParenR"/>
-            </a:pPr>
-            <a:r>
-              <a:rPr lang="en-US" sz="2000" dirty="0" smtClean="0"/>
-              <a:t>Forum posts in communities you are already members (please do not spam).</a:t>
-            </a:r>
-          </a:p>
-          <a:p>
-            <a:pPr marL="457200" indent="-457200">
-              <a:buAutoNum type="arabicParenR"/>
-            </a:pPr>
-            <a:r>
-              <a:rPr lang="en-US" sz="2000" dirty="0" smtClean="0"/>
-              <a:t>Telling classmates, teachers, coworkers about our PowerPoint Templates.</a:t>
-            </a:r>
-          </a:p>
-          <a:p>
-            <a:pPr marL="457200" indent="-457200">
-              <a:buAutoNum type="arabicParenR"/>
-            </a:pPr>
-            <a:r>
-              <a:rPr lang="en-US" sz="2000" dirty="0" smtClean="0"/>
-              <a:t>Placing one of our banners on your website, blog, etc.</a:t>
-            </a:r>
-            <a:endParaRPr lang="en-US" sz="2000" dirty="0"/>
-          </a:p>
-          <a:p>
-            <a:pPr marL="0" indent="0">
-              <a:buNone/>
-            </a:pPr>
-            <a:r>
-              <a:rPr lang="en-US" sz="2000" dirty="0" smtClean="0"/>
-              <a:t>Note: If you click the “site pages” menu on our website (http://sage-fox.com), you will see a “link to us” page, which contains various banners and codes for you to easily insert text or image links into forums, websites, etc.</a:t>
-            </a:r>
-          </a:p>
-          <a:p>
-            <a:pPr marL="0" indent="0">
-              <a:buNone/>
-            </a:pPr>
-            <a:endParaRPr lang="en-US" sz="2000" dirty="0" smtClean="0"/>
-          </a:p>
-        </p:txBody>
-      </p:sp>
-      <p:sp>
-        <p:nvSpPr>
-          <p:cNvPr id="7" name="TextBox 6"/>
-          <p:cNvSpPr txBox="1"/>
-          <p:nvPr/>
-        </p:nvSpPr>
-        <p:spPr>
-          <a:xfrm>
-            <a:off x="11731397" y="6704111"/>
-            <a:ext cx="329610" cy="107722"/>
-          </a:xfrm>
-          <a:prstGeom prst="rect">
-            <a:avLst/>
-          </a:prstGeom>
-          <a:noFill/>
-        </p:spPr>
-        <p:txBody>
-          <a:bodyPr wrap="square" rtlCol="0">
-            <a:spAutoFit/>
-          </a:bodyPr>
-          <a:lstStyle/>
-          <a:p>
-            <a:r>
-              <a:rPr lang="en-US" sz="100" dirty="0" smtClean="0">
-                <a:solidFill>
-                  <a:schemeClr val="bg1">
-                    <a:lumMod val="75000"/>
-                  </a:schemeClr>
-                </a:solidFill>
-                <a:hlinkClick r:id="rId2"/>
-              </a:rPr>
-              <a:t>Free PowerPoint Templates</a:t>
-            </a:r>
-            <a:endParaRPr lang="en-US" sz="100" dirty="0">
-              <a:solidFill>
-                <a:schemeClr val="bg1">
-                  <a:lumMod val="75000"/>
-                </a:schemeClr>
-              </a:solidFill>
-            </a:endParaRPr>
-          </a:p>
-        </p:txBody>
-      </p:sp>
-    </p:spTree>
-    <p:extLst>
-      <p:ext uri="{BB962C8B-B14F-4D97-AF65-F5344CB8AC3E}">
-        <p14:creationId xmlns:p14="http://schemas.microsoft.com/office/powerpoint/2010/main" val="1600223639"/>
-      </p:ext>
-    </p:extLst>
-  </p:cSld>
-  <p:clrMapOvr>
-    <a:masterClrMapping/>
-  </p:clrMapOvr>
-  <p:timing>
-    <p:tnLst>
-      <p:par>
-        <p:cTn id="1" dur="indefinite" restart="never" nodeType="tmRoot"/>
-      </p:par>
-    </p:tnLst>
-  </p:timing>
-</p:sld>
-</file>
-
-<file path=ppt/slides/slide21.xml><?xml version="1.0" encoding="utf-8"?>
-<p:sld xmlns:a="http://schemas.openxmlformats.org/drawingml/2006/main" xmlns:r="http://schemas.openxmlformats.org/officeDocument/2006/relationships" xmlns:p="http://schemas.openxmlformats.org/presentationml/2006/main">
-  <p:cSld>
-    <p:bg>
-      <p:bgPr>
-        <a:solidFill>
-          <a:srgbClr val="444444"/>
-        </a:solidFill>
-        <a:effectLst/>
-      </p:bgPr>
-    </p:bg>
-    <p:spTree>
-      <p:nvGrpSpPr>
-        <p:cNvPr id="1" name=""/>
-        <p:cNvGrpSpPr/>
-        <p:nvPr/>
-      </p:nvGrpSpPr>
-      <p:grpSpPr>
-        <a:xfrm>
-          <a:off x="0" y="0"/>
-          <a:ext cx="0" cy="0"/>
-          <a:chOff x="0" y="0"/>
-          <a:chExt cx="0" cy="0"/>
-        </a:xfrm>
-      </p:grpSpPr>
-      <p:sp>
-        <p:nvSpPr>
-          <p:cNvPr id="2" name="Title 1"/>
-          <p:cNvSpPr>
-            <a:spLocks noGrp="1"/>
-          </p:cNvSpPr>
-          <p:nvPr>
-            <p:ph type="title"/>
-          </p:nvPr>
-        </p:nvSpPr>
-        <p:spPr>
-          <a:xfrm>
-            <a:off x="3482000" y="366452"/>
-            <a:ext cx="5227998" cy="712904"/>
-          </a:xfrm>
-        </p:spPr>
-        <p:txBody>
-          <a:bodyPr/>
-          <a:lstStyle/>
-          <a:p>
-            <a:pPr algn="ctr"/>
-            <a:r>
-              <a:rPr lang="en-US" dirty="0">
-                <a:solidFill>
-                  <a:srgbClr val="FFFF00"/>
-                </a:solidFill>
-              </a:rPr>
-              <a:t>Copyright </a:t>
-            </a:r>
-            <a:r>
-              <a:rPr lang="en-US" dirty="0" smtClean="0">
-                <a:solidFill>
-                  <a:srgbClr val="FFFF00"/>
-                </a:solidFill>
-              </a:rPr>
-              <a:t>Notice</a:t>
-            </a:r>
-            <a:endParaRPr lang="en-US" dirty="0">
-              <a:solidFill>
-                <a:srgbClr val="FFFF00"/>
-              </a:solidFill>
-            </a:endParaRPr>
-          </a:p>
-        </p:txBody>
-      </p:sp>
-      <p:sp>
-        <p:nvSpPr>
-          <p:cNvPr id="3" name="Content Placeholder 2"/>
-          <p:cNvSpPr>
-            <a:spLocks noGrp="1"/>
-          </p:cNvSpPr>
-          <p:nvPr>
-            <p:ph idx="1"/>
-          </p:nvPr>
-        </p:nvSpPr>
-        <p:spPr>
-          <a:xfrm>
-            <a:off x="0" y="2830286"/>
-            <a:ext cx="12192000" cy="4027713"/>
-          </a:xfrm>
-          <a:solidFill>
-            <a:schemeClr val="bg1">
-              <a:lumMod val="85000"/>
-              <a:alpha val="90000"/>
-            </a:schemeClr>
-          </a:solidFill>
-        </p:spPr>
-        <p:txBody>
-          <a:bodyPr>
-            <a:normAutofit/>
-          </a:bodyPr>
-          <a:lstStyle/>
-          <a:p>
-            <a:pPr marL="0" indent="0">
-              <a:buNone/>
-            </a:pPr>
-            <a:r>
-              <a:rPr lang="en-US" sz="2400" b="1" dirty="0" smtClean="0"/>
-              <a:t>Allowed Actions:</a:t>
-            </a:r>
-          </a:p>
-          <a:p>
-            <a:pPr marL="0" indent="0">
-              <a:buNone/>
-            </a:pPr>
-            <a:r>
-              <a:rPr lang="en-US" sz="1600" dirty="0" smtClean="0"/>
-              <a:t>You are free to use for school, personal or business presentations. Just delete this slide and edit or delete other slides to fit your needs. No fees, no royalties, just free PowerPoint Templates for you to use as you wish.</a:t>
-            </a:r>
-          </a:p>
-          <a:p>
-            <a:pPr marL="0" indent="0">
-              <a:buNone/>
-            </a:pPr>
-            <a:r>
-              <a:rPr lang="en-US" sz="2400" b="1" dirty="0" smtClean="0"/>
-              <a:t>Not Allowed:</a:t>
-            </a:r>
-            <a:endParaRPr lang="en-US" sz="2400" b="1" dirty="0"/>
-          </a:p>
-          <a:p>
-            <a:pPr marL="0" indent="0">
-              <a:buNone/>
-            </a:pPr>
-            <a:r>
-              <a:rPr lang="en-US" sz="1600" dirty="0" smtClean="0"/>
-              <a:t>You are not authorized to redistribute in any manner. Even if you edit this document, it will still contain our hidden copyright watermark. As long as any product contains our hidden watermark, it is considered our intellectual property, with full protections under the law. If you are an educator, you are free to download and provide to your class as needed. </a:t>
-            </a:r>
-          </a:p>
-          <a:p>
-            <a:pPr marL="0" indent="0">
-              <a:buNone/>
-            </a:pPr>
-            <a:r>
-              <a:rPr lang="en-US" sz="2400" b="1" dirty="0" smtClean="0"/>
-              <a:t>Image </a:t>
-            </a:r>
-            <a:r>
-              <a:rPr lang="en-US" sz="2400" b="1" dirty="0"/>
-              <a:t>Usage Rights:</a:t>
-            </a:r>
-          </a:p>
-          <a:p>
-            <a:pPr marL="0" indent="0">
-              <a:buNone/>
-            </a:pPr>
-            <a:r>
-              <a:rPr lang="en-US" sz="1700" dirty="0"/>
-              <a:t>Most of our images are licensed through </a:t>
-            </a:r>
-            <a:r>
-              <a:rPr lang="en-US" sz="1700" dirty="0" smtClean="0"/>
-              <a:t>Shutterstock, </a:t>
-            </a:r>
-            <a:r>
-              <a:rPr lang="en-US" sz="1700" dirty="0"/>
-              <a:t>for use within our PowerPoint Templates only. You are free to modify and transfer photos between our templates, but use outside our templates could constitute a copyright violation. By providing these PowerPoint Templates to you, we are not transferring any of our licensing of images to be used outside these templates.</a:t>
-            </a:r>
-          </a:p>
-          <a:p>
-            <a:pPr marL="0" indent="0">
-              <a:buNone/>
-            </a:pPr>
-            <a:endParaRPr lang="en-US" sz="2000" dirty="0"/>
-          </a:p>
-        </p:txBody>
-      </p:sp>
-      <p:sp>
-        <p:nvSpPr>
-          <p:cNvPr id="5" name="TextBox 4"/>
-          <p:cNvSpPr txBox="1"/>
-          <p:nvPr/>
-        </p:nvSpPr>
-        <p:spPr>
-          <a:xfrm>
-            <a:off x="3913433" y="1197770"/>
-            <a:ext cx="4365133" cy="461665"/>
-          </a:xfrm>
-          <a:prstGeom prst="rect">
-            <a:avLst/>
-          </a:prstGeom>
-          <a:solidFill>
-            <a:srgbClr val="FF0000"/>
-          </a:solidFill>
-          <a:ln w="12700">
-            <a:solidFill>
-              <a:schemeClr val="tx1"/>
-            </a:solidFill>
-          </a:ln>
-        </p:spPr>
-        <p:txBody>
-          <a:bodyPr wrap="square" rtlCol="0">
-            <a:spAutoFit/>
-          </a:bodyPr>
-          <a:lstStyle/>
-          <a:p>
-            <a:pPr algn="ctr"/>
-            <a:r>
-              <a:rPr lang="en-US" sz="2400" dirty="0"/>
-              <a:t>© 2015-2016 sage-fox.com</a:t>
-            </a:r>
-          </a:p>
-        </p:txBody>
-      </p:sp>
-      <p:sp>
-        <p:nvSpPr>
-          <p:cNvPr id="4" name="TextBox 3"/>
-          <p:cNvSpPr txBox="1"/>
-          <p:nvPr/>
-        </p:nvSpPr>
-        <p:spPr>
-          <a:xfrm>
-            <a:off x="0" y="2008682"/>
-            <a:ext cx="12192000" cy="584775"/>
-          </a:xfrm>
-          <a:prstGeom prst="rect">
-            <a:avLst/>
-          </a:prstGeom>
-          <a:solidFill>
-            <a:schemeClr val="bg1"/>
-          </a:solidFill>
-        </p:spPr>
-        <p:txBody>
-          <a:bodyPr wrap="square" rtlCol="0">
-            <a:spAutoFit/>
-          </a:bodyPr>
-          <a:lstStyle/>
-          <a:p>
-            <a:pPr algn="ctr"/>
-            <a:r>
-              <a:rPr lang="en-US" sz="3200" dirty="0" smtClean="0"/>
-              <a:t>Delete This Slide. This is allowed usage information only.</a:t>
-            </a:r>
-          </a:p>
-        </p:txBody>
-      </p:sp>
-      <p:sp>
-        <p:nvSpPr>
-          <p:cNvPr id="7" name="TextBox 6"/>
-          <p:cNvSpPr txBox="1"/>
-          <p:nvPr/>
-        </p:nvSpPr>
-        <p:spPr>
-          <a:xfrm>
-            <a:off x="11731397" y="6704111"/>
-            <a:ext cx="329610" cy="107722"/>
-          </a:xfrm>
-          <a:prstGeom prst="rect">
-            <a:avLst/>
-          </a:prstGeom>
-          <a:noFill/>
-        </p:spPr>
-        <p:txBody>
-          <a:bodyPr wrap="square" rtlCol="0">
-            <a:spAutoFit/>
-          </a:bodyPr>
-          <a:lstStyle/>
-          <a:p>
-            <a:r>
-              <a:rPr lang="en-US" sz="100" dirty="0" smtClean="0">
-                <a:solidFill>
-                  <a:schemeClr val="bg1">
-                    <a:lumMod val="75000"/>
-                  </a:schemeClr>
-                </a:solidFill>
-                <a:hlinkClick r:id="rId2"/>
-              </a:rPr>
-              <a:t>Free PowerPoint Templates</a:t>
-            </a:r>
-            <a:endParaRPr lang="en-US" sz="100" dirty="0">
-              <a:solidFill>
-                <a:schemeClr val="bg1">
-                  <a:lumMod val="75000"/>
-                </a:schemeClr>
-              </a:solidFill>
-            </a:endParaRPr>
-          </a:p>
-        </p:txBody>
-      </p:sp>
-    </p:spTree>
-    <p:extLst>
-      <p:ext uri="{BB962C8B-B14F-4D97-AF65-F5344CB8AC3E}">
-        <p14:creationId xmlns:p14="http://schemas.microsoft.com/office/powerpoint/2010/main" val="1919190527"/>
-      </p:ext>
-    </p:extLst>
-  </p:cSld>
-  <p:clrMapOvr>
-    <a:masterClrMapping/>
-  </p:clrMapOvr>
-  <p:timing>
-    <p:tnLst>
-      <p:par>
-        <p:cTn id="1" dur="indefinite" restart="never" nodeType="tmRoot"/>
+        <p:cTn xmlns:p14="http://schemas.microsoft.com/office/powerpoint/2010/main" id="1" dur="indefinite" restart="never" nodeType="tmRoot"/>
       </p:par>
     </p:tnLst>
   </p:timing>
@@ -15380,7 +14378,7 @@
   <p:timing>
     <p:tnLst>
       <p:par>
-        <p:cTn id="1" dur="indefinite" restart="never" nodeType="tmRoot"/>
+        <p:cTn xmlns:p14="http://schemas.microsoft.com/office/powerpoint/2010/main" id="1" dur="indefinite" restart="never" nodeType="tmRoot"/>
       </p:par>
     </p:tnLst>
   </p:timing>
@@ -15426,7 +14424,7 @@
         </p:nvSpPr>
         <p:spPr>
           <a:xfrm>
-            <a:off x="-2" y="0"/>
+            <a:off x="0" y="0"/>
             <a:ext cx="12192000" cy="6858000"/>
           </a:xfrm>
           <a:prstGeom prst="rect">
@@ -15570,7 +14568,7 @@
         </p:nvSpPr>
         <p:spPr>
           <a:xfrm>
-            <a:off x="-1" y="1378414"/>
+            <a:off x="-36286" y="1432842"/>
             <a:ext cx="3657600" cy="1109116"/>
           </a:xfrm>
           <a:prstGeom prst="homePlate">
@@ -16225,47 +15223,6 @@
           <a:xfrm>
             <a:off x="6687265" y="1532168"/>
             <a:ext cx="5373742" cy="830997"/>
-          </a:xfrm>
-          <a:prstGeom prst="rect">
-            <a:avLst/>
-          </a:prstGeom>
-          <a:noFill/>
-        </p:spPr>
-        <p:txBody>
-          <a:bodyPr wrap="square" rtlCol="0">
-            <a:spAutoFit/>
-          </a:bodyPr>
-          <a:lstStyle/>
-          <a:p>
-            <a:r>
-              <a:rPr lang="en-US" sz="2400" dirty="0">
-                <a:solidFill>
-                  <a:schemeClr val="bg1"/>
-                </a:solidFill>
-                <a:latin typeface="+mj-lt"/>
-              </a:rPr>
-              <a:t>Lorem ipsum dolor sit amet, urna scelerisque</a:t>
-            </a:r>
-            <a:endParaRPr lang="en-US" sz="2400" dirty="0">
-              <a:solidFill>
-                <a:schemeClr val="bg1"/>
-              </a:solidFill>
-              <a:latin typeface="+mj-lt"/>
-              <a:cs typeface="Browallia New" panose="020B0604020202020204" pitchFamily="34" charset="-34"/>
-            </a:endParaRPr>
-          </a:p>
-        </p:txBody>
-      </p:sp>
-      <p:sp>
-        <p:nvSpPr>
-          <p:cNvPr id="51" name="TextBox 50"/>
-          <p:cNvSpPr txBox="1"/>
-          <p:nvPr/>
-        </p:nvSpPr>
-        <p:spPr>
-          <a:xfrm>
-            <a:off x="9058832" y="5189235"/>
-            <a:ext cx="3049774" cy="830997"/>
           </a:xfrm>
           <a:prstGeom prst="rect">
             <a:avLst/>
@@ -16577,6 +15534,50 @@
               <a:t>4</a:t>
             </a:r>
             <a:endParaRPr lang="en-US" sz="3000" dirty="0">
+              <a:cs typeface="Browallia New" panose="020B0604020202020204" pitchFamily="34" charset="-34"/>
+            </a:endParaRPr>
+          </a:p>
+        </p:txBody>
+      </p:sp>
+      <p:sp>
+        <p:nvSpPr>
+          <p:cNvPr id="32" name="TextBox 31"/>
+          <p:cNvSpPr txBox="1"/>
+          <p:nvPr/>
+        </p:nvSpPr>
+        <p:spPr>
+          <a:xfrm>
+            <a:off x="3973285" y="707572"/>
+            <a:ext cx="5261429" cy="707886"/>
+          </a:xfrm>
+          <a:prstGeom prst="rect">
+            <a:avLst/>
+          </a:prstGeom>
+          <a:solidFill>
+            <a:schemeClr val="accent1">
+              <a:alpha val="30000"/>
+            </a:schemeClr>
+          </a:solidFill>
+        </p:spPr>
+        <p:txBody>
+          <a:bodyPr wrap="square" rtlCol="0">
+            <a:spAutoFit/>
+          </a:bodyPr>
+          <a:lstStyle/>
+          <a:p>
+            <a:pPr algn="ctr"/>
+            <a:r>
+              <a:rPr lang="en-US" sz="4000" dirty="0" smtClean="0">
+                <a:solidFill>
+                  <a:schemeClr val="bg1"/>
+                </a:solidFill>
+              </a:rPr>
+              <a:t>Questions</a:t>
+            </a:r>
+            <a:endParaRPr lang="en-US" sz="4000" dirty="0">
+              <a:solidFill>
+                <a:schemeClr val="bg1"/>
+              </a:solidFill>
               <a:cs typeface="Browallia New" panose="020B0604020202020204" pitchFamily="34" charset="-34"/>
             </a:endParaRPr>
           </a:p>
@@ -16607,7 +15608,7 @@
   <p:timing>
     <p:tnLst>
       <p:par>
-        <p:cTn id="1" dur="indefinite" restart="never" nodeType="tmRoot"/>
+        <p:cTn xmlns:p14="http://schemas.microsoft.com/office/powerpoint/2010/main" id="1" dur="indefinite" restart="never" nodeType="tmRoot"/>
       </p:par>
     </p:tnLst>
   </p:timing>
@@ -16992,52 +15993,6 @@
       </p:sp>
       <p:sp>
         <p:nvSpPr>
-          <p:cNvPr id="43" name="Rounded Rectangle 42"/>
-          <p:cNvSpPr/>
-          <p:nvPr/>
-        </p:nvSpPr>
-        <p:spPr>
-          <a:xfrm>
-            <a:off x="3632687" y="667577"/>
-            <a:ext cx="4034354" cy="950507"/>
-          </a:xfrm>
-          <a:prstGeom prst="roundRect">
-            <a:avLst/>
-          </a:prstGeom>
-          <a:solidFill>
-            <a:schemeClr val="accent1"/>
-          </a:solidFill>
-          <a:ln>
-            <a:noFill/>
-          </a:ln>
-        </p:spPr>
-        <p:style>
-          <a:lnRef idx="2">
-            <a:schemeClr val="accent1">
-              <a:shade val="50000"/>
-            </a:schemeClr>
-          </a:lnRef>
-          <a:fillRef idx="1">
-            <a:schemeClr val="accent1"/>
-          </a:fillRef>
-          <a:effectRef idx="0">
-            <a:schemeClr val="accent1"/>
-          </a:effectRef>
-          <a:fontRef idx="minor">
-            <a:schemeClr val="lt1"/>
-          </a:fontRef>
-        </p:style>
-        <p:txBody>
-          <a:bodyPr rtlCol="0" anchor="ctr"/>
-          <a:lstStyle/>
-          <a:p>
-            <a:pPr algn="ctr"/>
-            <a:endParaRPr lang="en-US"/>
-          </a:p>
-        </p:txBody>
-      </p:sp>
-      <p:sp>
-        <p:nvSpPr>
           <p:cNvPr id="57" name="TextBox 56"/>
           <p:cNvSpPr txBox="1"/>
           <p:nvPr/>
@@ -17069,43 +16024,6 @@
             <a:r>
               <a:rPr lang="en-US" dirty="0"/>
               <a:t>three-dimensional model of real-world location of the circuit, which is in Baku, Azerbaijan. Furthermore, our 3D models include central streets of Baku, modern buildings and old towers of the city.</a:t>
-            </a:r>
-            <a:endParaRPr lang="en-US" sz="2400" dirty="0">
-              <a:latin typeface="+mj-lt"/>
-              <a:cs typeface="Browallia New" panose="020B0604020202020204" pitchFamily="34" charset="-34"/>
-            </a:endParaRPr>
-          </a:p>
-        </p:txBody>
-      </p:sp>
-      <p:sp>
-        <p:nvSpPr>
-          <p:cNvPr id="58" name="TextBox 57"/>
-          <p:cNvSpPr txBox="1"/>
-          <p:nvPr/>
-        </p:nvSpPr>
-        <p:spPr>
-          <a:xfrm>
-            <a:off x="3696589" y="701277"/>
-            <a:ext cx="4109930" cy="461665"/>
-          </a:xfrm>
-          <a:prstGeom prst="rect">
-            <a:avLst/>
-          </a:prstGeom>
-          <a:noFill/>
-        </p:spPr>
-        <p:txBody>
-          <a:bodyPr wrap="square" rtlCol="0">
-            <a:spAutoFit/>
-          </a:bodyPr>
-          <a:lstStyle/>
-          <a:p>
-            <a:r>
-              <a:rPr lang="en-US" sz="2400" dirty="0"/>
-              <a:t>Game </a:t>
-            </a:r>
-            <a:r>
-              <a:rPr lang="en-US" sz="2400" dirty="0" smtClean="0"/>
-              <a:t>Description: Overview</a:t>
             </a:r>
             <a:endParaRPr lang="en-US" sz="2400" dirty="0">
               <a:latin typeface="+mj-lt"/>
@@ -17377,6 +16295,51 @@
             <a:endParaRPr lang="en-US" sz="2400" dirty="0">
               <a:solidFill>
                 <a:schemeClr val="tx1"/>
+              </a:solidFill>
+              <a:cs typeface="Browallia New" panose="020B0604020202020204" pitchFamily="34" charset="-34"/>
+            </a:endParaRPr>
+          </a:p>
+        </p:txBody>
+      </p:sp>
+      <p:sp>
+        <p:nvSpPr>
+          <p:cNvPr id="20" name="TextBox 19"/>
+          <p:cNvSpPr txBox="1"/>
+          <p:nvPr/>
+        </p:nvSpPr>
+        <p:spPr>
+          <a:xfrm>
+            <a:off x="1" y="812306"/>
+            <a:ext cx="12192000" cy="646331"/>
+          </a:xfrm>
+          <a:prstGeom prst="rect">
+            <a:avLst/>
+          </a:prstGeom>
+          <a:solidFill>
+            <a:schemeClr val="accent1">
+              <a:alpha val="30000"/>
+            </a:schemeClr>
+          </a:solidFill>
+        </p:spPr>
+        <p:txBody>
+          <a:bodyPr wrap="square" rtlCol="0">
+            <a:spAutoFit/>
+          </a:bodyPr>
+          <a:lstStyle/>
+          <a:p>
+            <a:pPr algn="ctr"/>
+            <a:r>
+              <a:rPr lang="en-US" sz="3600" dirty="0">
+                <a:solidFill>
+                  <a:schemeClr val="bg1"/>
+                </a:solidFill>
+                <a:cs typeface="Browallia New" panose="020B0604020202020204" pitchFamily="34" charset="-34"/>
+              </a:rPr>
+              <a:t>Game Description: Overview</a:t>
+            </a:r>
+            <a:endParaRPr lang="en-US" sz="3600" dirty="0">
+              <a:solidFill>
+                <a:schemeClr val="bg1"/>
               </a:solidFill>
               <a:cs typeface="Browallia New" panose="020B0604020202020204" pitchFamily="34" charset="-34"/>
             </a:endParaRPr>
@@ -17408,7 +16371,7 @@
   <p:timing>
     <p:tnLst>
       <p:par>
-        <p:cTn id="1" dur="indefinite" restart="never" nodeType="tmRoot"/>
+        <p:cTn xmlns:p14="http://schemas.microsoft.com/office/powerpoint/2010/main" id="1" dur="indefinite" restart="never" nodeType="tmRoot"/>
       </p:par>
     </p:tnLst>
   </p:timing>
@@ -17919,16 +16882,7 @@
                 </a:solidFill>
                 <a:latin typeface="+mj-lt"/>
               </a:rPr>
-              <a:t> </a:t>
-            </a:r>
-            <a:r>
-              <a:rPr lang="en-US" sz="1400" dirty="0" smtClean="0">
-                <a:solidFill>
-                  <a:schemeClr val="bg1"/>
-                </a:solidFill>
-                <a:latin typeface="+mj-lt"/>
-              </a:rPr>
-              <a:t>AI drivers</a:t>
+              <a:t> AI drivers</a:t>
             </a:r>
             <a:endParaRPr lang="en-US" sz="1400" dirty="0">
               <a:solidFill>
@@ -17979,16 +16933,7 @@
                 </a:solidFill>
                 <a:latin typeface="+mj-lt"/>
               </a:rPr>
-              <a:t> </a:t>
-            </a:r>
-            <a:r>
-              <a:rPr lang="en-US" sz="1400" dirty="0" smtClean="0">
-                <a:solidFill>
-                  <a:schemeClr val="bg1"/>
-                </a:solidFill>
-                <a:latin typeface="+mj-lt"/>
-              </a:rPr>
-              <a:t>Cash</a:t>
+              <a:t> Cash</a:t>
             </a:r>
             <a:endParaRPr lang="en-US" sz="1400" dirty="0">
               <a:solidFill>
@@ -18039,16 +16984,7 @@
                 </a:solidFill>
                 <a:latin typeface="+mj-lt"/>
               </a:rPr>
-              <a:t> </a:t>
-            </a:r>
-            <a:r>
-              <a:rPr lang="en-US" sz="1400" dirty="0" smtClean="0">
-                <a:solidFill>
-                  <a:schemeClr val="bg1"/>
-                </a:solidFill>
-                <a:latin typeface="+mj-lt"/>
-              </a:rPr>
-              <a:t>Barriers</a:t>
+              <a:t> Barriers</a:t>
             </a:r>
             <a:endParaRPr lang="en-US" sz="1400" dirty="0">
               <a:solidFill>
@@ -18278,59 +17214,39 @@
       </p:sp>
       <p:sp>
         <p:nvSpPr>
-          <p:cNvPr id="32" name="Rounded Rectangle 31"/>
-          <p:cNvSpPr/>
-          <p:nvPr/>
-        </p:nvSpPr>
-        <p:spPr>
-          <a:xfrm>
-            <a:off x="7527042" y="373983"/>
-            <a:ext cx="3916112" cy="950507"/>
-          </a:xfrm>
-          <a:prstGeom prst="roundRect">
+          <p:cNvPr id="23" name="TextBox 22"/>
+          <p:cNvSpPr txBox="1"/>
+          <p:nvPr/>
+        </p:nvSpPr>
+        <p:spPr>
+          <a:xfrm>
+            <a:off x="5968999" y="308430"/>
+            <a:ext cx="6059714" cy="646331"/>
+          </a:xfrm>
+          <a:prstGeom prst="rect">
             <a:avLst/>
           </a:prstGeom>
           <a:solidFill>
-            <a:schemeClr val="accent1"/>
+            <a:schemeClr val="accent1">
+              <a:alpha val="30000"/>
+            </a:schemeClr>
           </a:solidFill>
-          <a:ln>
-            <a:noFill/>
-          </a:ln>
-        </p:spPr>
-        <p:style>
-          <a:lnRef idx="2">
-            <a:schemeClr val="accent1">
-              <a:shade val="50000"/>
-            </a:schemeClr>
-          </a:lnRef>
-          <a:fillRef idx="1">
-            <a:schemeClr val="accent1"/>
-          </a:fillRef>
-          <a:effectRef idx="0">
-            <a:schemeClr val="accent1"/>
-          </a:effectRef>
-          <a:fontRef idx="minor">
-            <a:schemeClr val="lt1"/>
-          </a:fontRef>
-        </p:style>
-        <p:txBody>
-          <a:bodyPr rtlCol="0" anchor="ctr"/>
+        </p:spPr>
+        <p:txBody>
+          <a:bodyPr wrap="square" rtlCol="0">
+            <a:spAutoFit/>
+          </a:bodyPr>
           <a:lstStyle/>
           <a:p>
             <a:pPr algn="ctr"/>
             <a:r>
-              <a:rPr lang="en-US" sz="2400" dirty="0">
+              <a:rPr lang="en-US" sz="3600" dirty="0">
                 <a:solidFill>
-                  <a:schemeClr val="tx1"/>
+                  <a:srgbClr val="FFFFFF"/>
                 </a:solidFill>
               </a:rPr>
               <a:t>Game Description: The Quest</a:t>
             </a:r>
-            <a:endParaRPr lang="en-US" sz="2400" dirty="0">
-              <a:solidFill>
-                <a:schemeClr val="tx1"/>
-              </a:solidFill>
-            </a:endParaRPr>
           </a:p>
         </p:txBody>
       </p:sp>
@@ -18359,7 +17275,7 @@
   <p:timing>
     <p:tnLst>
       <p:par>
-        <p:cTn id="1" dur="indefinite" restart="never" nodeType="tmRoot"/>
+        <p:cTn xmlns:p14="http://schemas.microsoft.com/office/powerpoint/2010/main" id="1" dur="indefinite" restart="never" nodeType="tmRoot"/>
       </p:par>
     </p:tnLst>
   </p:timing>
@@ -18973,8 +17889,49 @@
           <a:prstGeom prst="rect">
             <a:avLst/>
           </a:prstGeom>
+          <a:scene3d>
+            <a:camera prst="perspectiveBelow"/>
+            <a:lightRig rig="threePt" dir="t"/>
+          </a:scene3d>
         </p:spPr>
       </p:pic>
+      <p:cxnSp>
+        <p:nvCxnSpPr>
+          <p:cNvPr id="18" name="Straight Connector 17"/>
+          <p:cNvCxnSpPr>
+            <a:endCxn id="55" idx="1"/>
+          </p:cNvCxnSpPr>
+          <p:nvPr/>
+        </p:nvCxnSpPr>
+        <p:spPr>
+          <a:xfrm flipV="1">
+            <a:off x="3312886" y="3811023"/>
+            <a:ext cx="1802617" cy="1763196"/>
+          </a:xfrm>
+          <a:prstGeom prst="line">
+            <a:avLst/>
+          </a:prstGeom>
+          <a:ln>
+            <a:solidFill>
+              <a:schemeClr val="bg1"/>
+            </a:solidFill>
+          </a:ln>
+        </p:spPr>
+        <p:style>
+          <a:lnRef idx="1">
+            <a:schemeClr val="accent1"/>
+          </a:lnRef>
+          <a:fillRef idx="0">
+            <a:schemeClr val="accent1"/>
+          </a:fillRef>
+          <a:effectRef idx="0">
+            <a:schemeClr val="accent1"/>
+          </a:effectRef>
+          <a:fontRef idx="minor">
+            <a:schemeClr val="tx1"/>
+          </a:fontRef>
+        </p:style>
+      </p:cxnSp>
     </p:spTree>
     <p:extLst>
       <p:ext uri="{BB962C8B-B14F-4D97-AF65-F5344CB8AC3E}">
@@ -19000,7 +17957,7 @@
   <p:timing>
     <p:tnLst>
       <p:par>
-        <p:cTn id="1" dur="indefinite" restart="never" nodeType="tmRoot"/>
+        <p:cTn xmlns:p14="http://schemas.microsoft.com/office/powerpoint/2010/main" id="1" dur="indefinite" restart="never" nodeType="tmRoot"/>
       </p:par>
     </p:tnLst>
   </p:timing>
@@ -19231,7 +18188,6 @@
               <a:rPr lang="en-US" sz="3500" dirty="0"/>
               <a:t>Opponents</a:t>
             </a:r>
-            <a:endParaRPr lang="en-US" sz="3500" dirty="0"/>
           </a:p>
         </p:txBody>
       </p:sp>
@@ -19431,6 +18387,10 @@
           <a:prstGeom prst="rect">
             <a:avLst/>
           </a:prstGeom>
+          <a:scene3d>
+            <a:camera prst="perspectiveContrastingRightFacing"/>
+            <a:lightRig rig="threePt" dir="t"/>
+          </a:scene3d>
         </p:spPr>
       </p:pic>
       <p:pic>
@@ -19455,7 +18415,27 @@
           <a:prstGeom prst="rect">
             <a:avLst/>
           </a:prstGeom>
-        </p:spPr>
+          <a:scene3d>
+            <a:camera prst="perspectiveContrastingLeftFacing"/>
+            <a:lightRig rig="threePt" dir="t"/>
+          </a:scene3d>
+        </p:spPr>
+        <p:style>
+          <a:lnRef idx="2">
+            <a:schemeClr val="dk1">
+              <a:shade val="50000"/>
+            </a:schemeClr>
+          </a:lnRef>
+          <a:fillRef idx="1">
+            <a:schemeClr val="dk1"/>
+          </a:fillRef>
+          <a:effectRef idx="0">
+            <a:schemeClr val="dk1"/>
+          </a:effectRef>
+          <a:fontRef idx="minor">
+            <a:schemeClr val="lt1"/>
+          </a:fontRef>
+        </p:style>
       </p:pic>
     </p:spTree>
     <p:extLst>
@@ -19482,7 +18462,7 @@
   <p:timing>
     <p:tnLst>
       <p:par>
-        <p:cTn id="1" dur="indefinite" restart="never" nodeType="tmRoot"/>
+        <p:cTn xmlns:p14="http://schemas.microsoft.com/office/powerpoint/2010/main" id="1" dur="indefinite" restart="never" nodeType="tmRoot"/>
       </p:par>
     </p:tnLst>
   </p:timing>
@@ -20122,7 +19102,7 @@
   <p:timing>
     <p:tnLst>
       <p:par>
-        <p:cTn id="1" dur="indefinite" restart="never" nodeType="tmRoot"/>
+        <p:cTn xmlns:p14="http://schemas.microsoft.com/office/powerpoint/2010/main" id="1" dur="indefinite" restart="never" nodeType="tmRoot"/>
       </p:par>
     </p:tnLst>
   </p:timing>
@@ -20172,7 +19152,7 @@
     </a:clrScheme>
     <a:fontScheme name="Office">
       <a:majorFont>
-        <a:latin typeface="Calibri Light" panose="020F0302020204030204"/>
+        <a:latin typeface="Calibri Light"/>
         <a:ea typeface=""/>
         <a:cs typeface=""/>
         <a:font script="Jpan" typeface="ＭＳ Ｐゴシック"/>
@@ -20207,7 +19187,7 @@
         <a:font script="Geor" typeface="Sylfaen"/>
       </a:majorFont>
       <a:minorFont>
-        <a:latin typeface="Calibri" panose="020F0502020204030204"/>
+        <a:latin typeface="Calibri"/>
         <a:ea typeface=""/>
         <a:cs typeface=""/>
         <a:font script="Jpan" typeface="ＭＳ Ｐゴシック"/>
@@ -20384,7 +19364,7 @@
   <a:extraClrSchemeLst/>
   <a:extLst>
     <a:ext uri="{05A4C25C-085E-4340-85A3-A5531E510DB2}">
-      <thm15:themeFamily xmlns:thm15="http://schemas.microsoft.com/office/thememl/2012/main" name="Office Theme" id="{62F939B6-93AF-4DB8-9C6B-D6C7DFDC589F}" vid="{4A3C46E8-61CC-4603-A589-7422A47A8E4A}"/>
+      <thm15:themeFamily xmlns:thm15="http://schemas.microsoft.com/office/thememl/2012/main" xmlns="" name="Office Theme" id="{62F939B6-93AF-4DB8-9C6B-D6C7DFDC589F}" vid="{4A3C46E8-61CC-4603-A589-7422A47A8E4A}"/>
     </a:ext>
   </a:extLst>
 </a:theme>
@@ -20433,7 +19413,7 @@
     </a:clrScheme>
     <a:fontScheme name="Office">
       <a:majorFont>
-        <a:latin typeface="Calibri Light" panose="020F0302020204030204"/>
+        <a:latin typeface="Calibri Light"/>
         <a:ea typeface=""/>
         <a:cs typeface=""/>
         <a:font script="Jpan" typeface="ＭＳ Ｐゴシック"/>
@@ -20468,7 +19448,7 @@
         <a:font script="Geor" typeface="Sylfaen"/>
       </a:majorFont>
       <a:minorFont>
-        <a:latin typeface="Calibri" panose="020F0502020204030204"/>
+        <a:latin typeface="Calibri"/>
         <a:ea typeface=""/>
         <a:cs typeface=""/>
         <a:font script="Jpan" typeface="ＭＳ Ｐゴシック"/>
@@ -20645,7 +19625,7 @@
   <a:extraClrSchemeLst/>
   <a:extLst>
     <a:ext uri="{05A4C25C-085E-4340-85A3-A5531E510DB2}">
-      <thm15:themeFamily xmlns:thm15="http://schemas.microsoft.com/office/thememl/2012/main" name="Office Theme" id="{62F939B6-93AF-4DB8-9C6B-D6C7DFDC589F}" vid="{4A3C46E8-61CC-4603-A589-7422A47A8E4A}"/>
+      <thm15:themeFamily xmlns:thm15="http://schemas.microsoft.com/office/thememl/2012/main" xmlns="" name="Office Theme" id="{62F939B6-93AF-4DB8-9C6B-D6C7DFDC589F}" vid="{4A3C46E8-61CC-4603-A589-7422A47A8E4A}"/>
     </a:ext>
   </a:extLst>
 </a:theme>

</xml_diff>